<commit_message>
Implement semaphore for load and save xml setting file
Signed-off-by: cuonghv2010 <cuonghv201095@gmail.com>
</commit_message>
<xml_diff>
--- a/basic/xmlSettingFile_Singleton_Semaphore/readme.pptx
+++ b/basic/xmlSettingFile_Singleton_Semaphore/readme.pptx
@@ -262,7 +262,7 @@
           <a:p>
             <a:fld id="{E367C172-55BE-4236-9969-D03914048A1F}" type="datetimeFigureOut">
               <a:rPr kumimoji="1" lang="ja-JP" altLang="en-US" smtClean="0"/>
-              <a:t>2023/1/7</a:t>
+              <a:t>2023/1/9</a:t>
             </a:fld>
             <a:endParaRPr kumimoji="1" lang="ja-JP" altLang="en-US"/>
           </a:p>
@@ -462,7 +462,7 @@
           <a:p>
             <a:fld id="{E367C172-55BE-4236-9969-D03914048A1F}" type="datetimeFigureOut">
               <a:rPr kumimoji="1" lang="ja-JP" altLang="en-US" smtClean="0"/>
-              <a:t>2023/1/7</a:t>
+              <a:t>2023/1/9</a:t>
             </a:fld>
             <a:endParaRPr kumimoji="1" lang="ja-JP" altLang="en-US"/>
           </a:p>
@@ -672,7 +672,7 @@
           <a:p>
             <a:fld id="{E367C172-55BE-4236-9969-D03914048A1F}" type="datetimeFigureOut">
               <a:rPr kumimoji="1" lang="ja-JP" altLang="en-US" smtClean="0"/>
-              <a:t>2023/1/7</a:t>
+              <a:t>2023/1/9</a:t>
             </a:fld>
             <a:endParaRPr kumimoji="1" lang="ja-JP" altLang="en-US"/>
           </a:p>
@@ -872,7 +872,7 @@
           <a:p>
             <a:fld id="{E367C172-55BE-4236-9969-D03914048A1F}" type="datetimeFigureOut">
               <a:rPr kumimoji="1" lang="ja-JP" altLang="en-US" smtClean="0"/>
-              <a:t>2023/1/7</a:t>
+              <a:t>2023/1/9</a:t>
             </a:fld>
             <a:endParaRPr kumimoji="1" lang="ja-JP" altLang="en-US"/>
           </a:p>
@@ -1148,7 +1148,7 @@
           <a:p>
             <a:fld id="{E367C172-55BE-4236-9969-D03914048A1F}" type="datetimeFigureOut">
               <a:rPr kumimoji="1" lang="ja-JP" altLang="en-US" smtClean="0"/>
-              <a:t>2023/1/7</a:t>
+              <a:t>2023/1/9</a:t>
             </a:fld>
             <a:endParaRPr kumimoji="1" lang="ja-JP" altLang="en-US"/>
           </a:p>
@@ -1416,7 +1416,7 @@
           <a:p>
             <a:fld id="{E367C172-55BE-4236-9969-D03914048A1F}" type="datetimeFigureOut">
               <a:rPr kumimoji="1" lang="ja-JP" altLang="en-US" smtClean="0"/>
-              <a:t>2023/1/7</a:t>
+              <a:t>2023/1/9</a:t>
             </a:fld>
             <a:endParaRPr kumimoji="1" lang="ja-JP" altLang="en-US"/>
           </a:p>
@@ -1831,7 +1831,7 @@
           <a:p>
             <a:fld id="{E367C172-55BE-4236-9969-D03914048A1F}" type="datetimeFigureOut">
               <a:rPr kumimoji="1" lang="ja-JP" altLang="en-US" smtClean="0"/>
-              <a:t>2023/1/7</a:t>
+              <a:t>2023/1/9</a:t>
             </a:fld>
             <a:endParaRPr kumimoji="1" lang="ja-JP" altLang="en-US"/>
           </a:p>
@@ -1973,7 +1973,7 @@
           <a:p>
             <a:fld id="{E367C172-55BE-4236-9969-D03914048A1F}" type="datetimeFigureOut">
               <a:rPr kumimoji="1" lang="ja-JP" altLang="en-US" smtClean="0"/>
-              <a:t>2023/1/7</a:t>
+              <a:t>2023/1/9</a:t>
             </a:fld>
             <a:endParaRPr kumimoji="1" lang="ja-JP" altLang="en-US"/>
           </a:p>
@@ -2086,7 +2086,7 @@
           <a:p>
             <a:fld id="{E367C172-55BE-4236-9969-D03914048A1F}" type="datetimeFigureOut">
               <a:rPr kumimoji="1" lang="ja-JP" altLang="en-US" smtClean="0"/>
-              <a:t>2023/1/7</a:t>
+              <a:t>2023/1/9</a:t>
             </a:fld>
             <a:endParaRPr kumimoji="1" lang="ja-JP" altLang="en-US"/>
           </a:p>
@@ -2399,7 +2399,7 @@
           <a:p>
             <a:fld id="{E367C172-55BE-4236-9969-D03914048A1F}" type="datetimeFigureOut">
               <a:rPr kumimoji="1" lang="ja-JP" altLang="en-US" smtClean="0"/>
-              <a:t>2023/1/7</a:t>
+              <a:t>2023/1/9</a:t>
             </a:fld>
             <a:endParaRPr kumimoji="1" lang="ja-JP" altLang="en-US"/>
           </a:p>
@@ -2688,7 +2688,7 @@
           <a:p>
             <a:fld id="{E367C172-55BE-4236-9969-D03914048A1F}" type="datetimeFigureOut">
               <a:rPr kumimoji="1" lang="ja-JP" altLang="en-US" smtClean="0"/>
-              <a:t>2023/1/7</a:t>
+              <a:t>2023/1/9</a:t>
             </a:fld>
             <a:endParaRPr kumimoji="1" lang="ja-JP" altLang="en-US"/>
           </a:p>
@@ -2931,7 +2931,7 @@
           <a:p>
             <a:fld id="{E367C172-55BE-4236-9969-D03914048A1F}" type="datetimeFigureOut">
               <a:rPr kumimoji="1" lang="ja-JP" altLang="en-US" smtClean="0"/>
-              <a:t>2023/1/7</a:t>
+              <a:t>2023/1/9</a:t>
             </a:fld>
             <a:endParaRPr kumimoji="1" lang="ja-JP" altLang="en-US"/>
           </a:p>
@@ -3363,7 +3363,7 @@
         <p:spPr>
           <a:xfrm>
             <a:off x="482406" y="1269560"/>
-            <a:ext cx="10525638" cy="923330"/>
+            <a:ext cx="10525638" cy="1477328"/>
           </a:xfrm>
           <a:prstGeom prst="rect">
             <a:avLst/>
@@ -3556,6 +3556,51 @@
             <a:r>
               <a:rPr lang="en-US" altLang="ja-JP" dirty="0"/>
               <a:t> update xml file</a:t>
+            </a:r>
+          </a:p>
+          <a:p>
+            <a:endParaRPr lang="en-US" altLang="ja-JP" dirty="0"/>
+          </a:p>
+          <a:p>
+            <a:r>
+              <a:rPr lang="en-US" altLang="ja-JP" dirty="0" err="1"/>
+              <a:t>Sử</a:t>
+            </a:r>
+            <a:r>
+              <a:rPr lang="ja-JP" altLang="en-US" dirty="0"/>
+              <a:t> </a:t>
+            </a:r>
+            <a:r>
+              <a:rPr lang="en-US" altLang="ja-JP" dirty="0" err="1"/>
+              <a:t>dụng</a:t>
+            </a:r>
+            <a:r>
+              <a:rPr lang="en-US" altLang="ja-JP" dirty="0"/>
+              <a:t> </a:t>
+            </a:r>
+            <a:r>
+              <a:rPr lang="en-US" altLang="ja-JP" dirty="0" err="1"/>
+              <a:t>kỹ</a:t>
+            </a:r>
+            <a:r>
+              <a:rPr lang="en-US" altLang="ja-JP" dirty="0"/>
+              <a:t> </a:t>
+            </a:r>
+            <a:r>
+              <a:rPr lang="en-US" altLang="ja-JP" dirty="0" err="1"/>
+              <a:t>thuật</a:t>
+            </a:r>
+            <a:r>
+              <a:rPr lang="en-US" altLang="ja-JP" dirty="0"/>
+              <a:t> </a:t>
+            </a:r>
+            <a:r>
+              <a:rPr lang="en-US" altLang="ja-JP" dirty="0" err="1"/>
+              <a:t>đọc</a:t>
+            </a:r>
+            <a:r>
+              <a:rPr lang="en-US" altLang="ja-JP" dirty="0"/>
+              <a:t> stream, singleton , Lazy &lt;T&gt;, Semaphore</a:t>
             </a:r>
           </a:p>
         </p:txBody>
@@ -3592,10 +3637,10 @@
       </p:grpSpPr>
       <p:sp>
         <p:nvSpPr>
-          <p:cNvPr id="2" name="Title 1">
-            <a:extLst>
-              <a:ext uri="{FF2B5EF4-FFF2-40B4-BE49-F238E27FC236}">
-                <a16:creationId xmlns:a16="http://schemas.microsoft.com/office/drawing/2014/main" id="{0DA7EC39-2323-4027-8CC9-F98F71B1DDEA}"/>
+          <p:cNvPr id="5" name="Title 4">
+            <a:extLst>
+              <a:ext uri="{FF2B5EF4-FFF2-40B4-BE49-F238E27FC236}">
+                <a16:creationId xmlns:a16="http://schemas.microsoft.com/office/drawing/2014/main" id="{1A61C924-7205-40C3-9DDC-C17D2F5B2A72}"/>
               </a:ext>
             </a:extLst>
           </p:cNvPr>
@@ -3608,88 +3653,48 @@
         </p:nvSpPr>
         <p:spPr>
           <a:xfrm>
-            <a:off x="0" y="142614"/>
-            <a:ext cx="12192000" cy="478171"/>
+            <a:off x="28355" y="54042"/>
+            <a:ext cx="10515600" cy="1325563"/>
           </a:xfrm>
         </p:spPr>
         <p:txBody>
-          <a:bodyPr>
-            <a:normAutofit fontScale="90000"/>
-          </a:bodyPr>
+          <a:bodyPr/>
           <a:lstStyle/>
           <a:p>
             <a:r>
-              <a:rPr kumimoji="1" lang="en-US" altLang="ja-JP" dirty="0" err="1"/>
-              <a:t>Đọc</a:t>
-            </a:r>
-            <a:r>
-              <a:rPr kumimoji="1" lang="en-US" altLang="ja-JP" dirty="0"/>
-              <a:t> </a:t>
-            </a:r>
-            <a:r>
-              <a:rPr kumimoji="1" lang="en-US" altLang="ja-JP" dirty="0" err="1"/>
-              <a:t>dữ</a:t>
-            </a:r>
-            <a:r>
-              <a:rPr kumimoji="1" lang="en-US" altLang="ja-JP" dirty="0"/>
-              <a:t> </a:t>
-            </a:r>
-            <a:r>
-              <a:rPr kumimoji="1" lang="en-US" altLang="ja-JP" dirty="0" err="1"/>
-              <a:t>liệu</a:t>
-            </a:r>
-            <a:r>
-              <a:rPr kumimoji="1" lang="en-US" altLang="ja-JP" dirty="0"/>
-              <a:t> </a:t>
-            </a:r>
-            <a:r>
-              <a:rPr kumimoji="1" lang="en-US" altLang="ja-JP" dirty="0" err="1"/>
-              <a:t>từ</a:t>
-            </a:r>
-            <a:r>
-              <a:rPr kumimoji="1" lang="en-US" altLang="ja-JP" dirty="0"/>
-              <a:t> file xml </a:t>
-            </a:r>
-            <a:r>
-              <a:rPr kumimoji="1" lang="en-US" altLang="ja-JP" dirty="0" err="1"/>
-              <a:t>và</a:t>
-            </a:r>
-            <a:r>
               <a:rPr lang="en-US" altLang="ja-JP" dirty="0" err="1"/>
-              <a:t>o</a:t>
+              <a:t>Lý</a:t>
             </a:r>
             <a:r>
               <a:rPr lang="en-US" altLang="ja-JP" dirty="0"/>
-              <a:t> xml object </a:t>
+              <a:t> do </a:t>
             </a:r>
             <a:r>
               <a:rPr lang="en-US" altLang="ja-JP" dirty="0" err="1"/>
-              <a:t>với</a:t>
+              <a:t>cần</a:t>
             </a:r>
             <a:r>
               <a:rPr lang="en-US" altLang="ja-JP" dirty="0"/>
               <a:t> </a:t>
             </a:r>
             <a:r>
-              <a:rPr lang="en-US" altLang="ja-JP" b="1" i="0" dirty="0">
-                <a:solidFill>
-                  <a:srgbClr val="171717"/>
-                </a:solidFill>
-                <a:effectLst/>
-                <a:latin typeface="Segoe UI" panose="020B0502040204020203" pitchFamily="34" charset="0"/>
-              </a:rPr>
-              <a:t>Deserialize</a:t>
-            </a:r>
-            <a:endParaRPr kumimoji="1" lang="ja-JP" altLang="en-US" dirty="0"/>
-          </a:p>
-        </p:txBody>
-      </p:sp>
-      <p:sp>
-        <p:nvSpPr>
-          <p:cNvPr id="3" name="TextBox 2">
-            <a:extLst>
-              <a:ext uri="{FF2B5EF4-FFF2-40B4-BE49-F238E27FC236}">
-                <a16:creationId xmlns:a16="http://schemas.microsoft.com/office/drawing/2014/main" id="{44AB704A-783B-494A-BE9A-57691D9A32D3}"/>
+              <a:rPr lang="en-US" altLang="ja-JP" dirty="0" err="1"/>
+              <a:t>dùng</a:t>
+            </a:r>
+            <a:r>
+              <a:rPr lang="en-US" altLang="ja-JP" dirty="0"/>
+              <a:t> semaphore</a:t>
+            </a:r>
+            <a:endParaRPr lang="ja-JP" altLang="en-US" dirty="0"/>
+          </a:p>
+        </p:txBody>
+      </p:sp>
+      <p:sp>
+        <p:nvSpPr>
+          <p:cNvPr id="9" name="TextBox 8">
+            <a:extLst>
+              <a:ext uri="{FF2B5EF4-FFF2-40B4-BE49-F238E27FC236}">
+                <a16:creationId xmlns:a16="http://schemas.microsoft.com/office/drawing/2014/main" id="{C4F71931-0438-4D7D-BC99-5FC76232B5E6}"/>
               </a:ext>
             </a:extLst>
           </p:cNvPr>
@@ -3698,8 +3703,8 @@
         </p:nvSpPr>
         <p:spPr>
           <a:xfrm>
-            <a:off x="184558" y="906011"/>
-            <a:ext cx="8770350" cy="1200329"/>
+            <a:off x="2176323" y="2147706"/>
+            <a:ext cx="6097554" cy="4154984"/>
           </a:xfrm>
           <a:prstGeom prst="rect">
             <a:avLst/>
@@ -3707,227 +3712,1317 @@
           <a:noFill/>
         </p:spPr>
         <p:txBody>
+          <a:bodyPr wrap="square">
+            <a:spAutoFit/>
+          </a:bodyPr>
+          <a:lstStyle/>
+          <a:p>
+            <a:r>
+              <a:rPr lang="en-US" altLang="ja-JP" sz="1100" dirty="0">
+                <a:solidFill>
+                  <a:srgbClr val="00B050"/>
+                </a:solidFill>
+                <a:latin typeface="Cascadia Mono" panose="020B0609020000020004" pitchFamily="49" charset="0"/>
+              </a:rPr>
+              <a:t>========</a:t>
+            </a:r>
+            <a:r>
+              <a:rPr lang="en-US" altLang="ja-JP" sz="1100" dirty="0" err="1">
+                <a:solidFill>
+                  <a:srgbClr val="00B050"/>
+                </a:solidFill>
+                <a:latin typeface="Cascadia Mono" panose="020B0609020000020004" pitchFamily="49" charset="0"/>
+              </a:rPr>
+              <a:t>SubThread</a:t>
+            </a:r>
+            <a:r>
+              <a:rPr lang="en-US" altLang="ja-JP" sz="1100" dirty="0">
+                <a:solidFill>
+                  <a:srgbClr val="00B050"/>
+                </a:solidFill>
+                <a:latin typeface="Cascadia Mono" panose="020B0609020000020004" pitchFamily="49" charset="0"/>
+              </a:rPr>
+              <a:t> 1 before:=======</a:t>
+            </a:r>
+          </a:p>
+          <a:p>
+            <a:r>
+              <a:rPr lang="en-US" altLang="ja-JP" sz="1100" dirty="0">
+                <a:solidFill>
+                  <a:srgbClr val="00B050"/>
+                </a:solidFill>
+                <a:latin typeface="Cascadia Mono" panose="020B0609020000020004" pitchFamily="49" charset="0"/>
+              </a:rPr>
+              <a:t>Element12Element32Element22</a:t>
+            </a:r>
+          </a:p>
+          <a:p>
+            <a:r>
+              <a:rPr lang="en-US" altLang="ja-JP" sz="1100" dirty="0">
+                <a:solidFill>
+                  <a:srgbClr val="00B050"/>
+                </a:solidFill>
+                <a:latin typeface="Cascadia Mono" panose="020B0609020000020004" pitchFamily="49" charset="0"/>
+              </a:rPr>
+              <a:t>========</a:t>
+            </a:r>
+            <a:r>
+              <a:rPr lang="en-US" altLang="ja-JP" sz="1100" dirty="0" err="1">
+                <a:solidFill>
+                  <a:srgbClr val="00B050"/>
+                </a:solidFill>
+                <a:latin typeface="Cascadia Mono" panose="020B0609020000020004" pitchFamily="49" charset="0"/>
+              </a:rPr>
+              <a:t>SubThread</a:t>
+            </a:r>
+            <a:r>
+              <a:rPr lang="en-US" altLang="ja-JP" sz="1100" dirty="0">
+                <a:solidFill>
+                  <a:srgbClr val="00B050"/>
+                </a:solidFill>
+                <a:latin typeface="Cascadia Mono" panose="020B0609020000020004" pitchFamily="49" charset="0"/>
+              </a:rPr>
+              <a:t> 2 before:=======</a:t>
+            </a:r>
+          </a:p>
+          <a:p>
+            <a:r>
+              <a:rPr lang="en-US" altLang="ja-JP" sz="1100" dirty="0">
+                <a:solidFill>
+                  <a:srgbClr val="00B050"/>
+                </a:solidFill>
+                <a:latin typeface="Cascadia Mono" panose="020B0609020000020004" pitchFamily="49" charset="0"/>
+              </a:rPr>
+              <a:t>Element11Element31Element21</a:t>
+            </a:r>
+          </a:p>
+          <a:p>
+            <a:r>
+              <a:rPr lang="en-US" altLang="ja-JP" sz="1100" dirty="0">
+                <a:solidFill>
+                  <a:srgbClr val="00B050"/>
+                </a:solidFill>
+                <a:latin typeface="Cascadia Mono" panose="020B0609020000020004" pitchFamily="49" charset="0"/>
+              </a:rPr>
+              <a:t>========</a:t>
+            </a:r>
+            <a:r>
+              <a:rPr lang="en-US" altLang="ja-JP" sz="1100" dirty="0" err="1">
+                <a:solidFill>
+                  <a:srgbClr val="00B050"/>
+                </a:solidFill>
+                <a:latin typeface="Cascadia Mono" panose="020B0609020000020004" pitchFamily="49" charset="0"/>
+              </a:rPr>
+              <a:t>SubThread</a:t>
+            </a:r>
+            <a:r>
+              <a:rPr lang="en-US" altLang="ja-JP" sz="1100" dirty="0">
+                <a:solidFill>
+                  <a:srgbClr val="00B050"/>
+                </a:solidFill>
+                <a:latin typeface="Cascadia Mono" panose="020B0609020000020004" pitchFamily="49" charset="0"/>
+              </a:rPr>
+              <a:t> 2 after:=======</a:t>
+            </a:r>
+          </a:p>
+          <a:p>
+            <a:r>
+              <a:rPr lang="en-US" altLang="ja-JP" sz="1100" dirty="0">
+                <a:solidFill>
+                  <a:srgbClr val="00B050"/>
+                </a:solidFill>
+                <a:latin typeface="Cascadia Mono" panose="020B0609020000020004" pitchFamily="49" charset="0"/>
+              </a:rPr>
+              <a:t>Element12Element32Element22</a:t>
+            </a:r>
+          </a:p>
+          <a:p>
+            <a:r>
+              <a:rPr lang="en-US" altLang="ja-JP" sz="1100" dirty="0">
+                <a:solidFill>
+                  <a:srgbClr val="00B050"/>
+                </a:solidFill>
+                <a:latin typeface="Cascadia Mono" panose="020B0609020000020004" pitchFamily="49" charset="0"/>
+              </a:rPr>
+              <a:t>========</a:t>
+            </a:r>
+            <a:r>
+              <a:rPr lang="en-US" altLang="ja-JP" sz="1100" dirty="0" err="1">
+                <a:solidFill>
+                  <a:srgbClr val="00B050"/>
+                </a:solidFill>
+                <a:latin typeface="Cascadia Mono" panose="020B0609020000020004" pitchFamily="49" charset="0"/>
+              </a:rPr>
+              <a:t>SubThread</a:t>
+            </a:r>
+            <a:r>
+              <a:rPr lang="en-US" altLang="ja-JP" sz="1100" dirty="0">
+                <a:solidFill>
+                  <a:srgbClr val="00B050"/>
+                </a:solidFill>
+                <a:latin typeface="Cascadia Mono" panose="020B0609020000020004" pitchFamily="49" charset="0"/>
+              </a:rPr>
+              <a:t> 1 after:=======</a:t>
+            </a:r>
+          </a:p>
+          <a:p>
+            <a:r>
+              <a:rPr lang="en-US" altLang="ja-JP" sz="1100" dirty="0">
+                <a:solidFill>
+                  <a:srgbClr val="00B050"/>
+                </a:solidFill>
+                <a:latin typeface="Cascadia Mono" panose="020B0609020000020004" pitchFamily="49" charset="0"/>
+              </a:rPr>
+              <a:t>Element12Element32Element22</a:t>
+            </a:r>
+          </a:p>
+          <a:p>
+            <a:r>
+              <a:rPr lang="en-US" altLang="ja-JP" sz="1100" dirty="0">
+                <a:solidFill>
+                  <a:srgbClr val="FF0000"/>
+                </a:solidFill>
+                <a:latin typeface="Cascadia Mono" panose="020B0609020000020004" pitchFamily="49" charset="0"/>
+              </a:rPr>
+              <a:t>========</a:t>
+            </a:r>
+            <a:r>
+              <a:rPr lang="en-US" altLang="ja-JP" sz="1100" dirty="0" err="1">
+                <a:solidFill>
+                  <a:srgbClr val="FF0000"/>
+                </a:solidFill>
+                <a:latin typeface="Cascadia Mono" panose="020B0609020000020004" pitchFamily="49" charset="0"/>
+              </a:rPr>
+              <a:t>SubThread</a:t>
+            </a:r>
+            <a:r>
+              <a:rPr lang="en-US" altLang="ja-JP" sz="1100" dirty="0">
+                <a:solidFill>
+                  <a:srgbClr val="FF0000"/>
+                </a:solidFill>
+                <a:latin typeface="Cascadia Mono" panose="020B0609020000020004" pitchFamily="49" charset="0"/>
+              </a:rPr>
+              <a:t> 2 before:=======</a:t>
+            </a:r>
+          </a:p>
+          <a:p>
+            <a:endParaRPr lang="ja-JP" altLang="en-US" sz="1100" dirty="0">
+              <a:solidFill>
+                <a:srgbClr val="FF0000"/>
+              </a:solidFill>
+              <a:latin typeface="Cascadia Mono" panose="020B0609020000020004" pitchFamily="49" charset="0"/>
+            </a:endParaRPr>
+          </a:p>
+          <a:p>
+            <a:r>
+              <a:rPr lang="en-US" altLang="ja-JP" sz="1100" dirty="0">
+                <a:solidFill>
+                  <a:srgbClr val="FF0000"/>
+                </a:solidFill>
+                <a:latin typeface="Cascadia Mono" panose="020B0609020000020004" pitchFamily="49" charset="0"/>
+              </a:rPr>
+              <a:t>========</a:t>
+            </a:r>
+            <a:r>
+              <a:rPr lang="en-US" altLang="ja-JP" sz="1100" dirty="0" err="1">
+                <a:solidFill>
+                  <a:srgbClr val="FF0000"/>
+                </a:solidFill>
+                <a:latin typeface="Cascadia Mono" panose="020B0609020000020004" pitchFamily="49" charset="0"/>
+              </a:rPr>
+              <a:t>SubThread</a:t>
+            </a:r>
+            <a:r>
+              <a:rPr lang="en-US" altLang="ja-JP" sz="1100" dirty="0">
+                <a:solidFill>
+                  <a:srgbClr val="FF0000"/>
+                </a:solidFill>
+                <a:latin typeface="Cascadia Mono" panose="020B0609020000020004" pitchFamily="49" charset="0"/>
+              </a:rPr>
+              <a:t> 1 before:=======</a:t>
+            </a:r>
+          </a:p>
+          <a:p>
+            <a:r>
+              <a:rPr lang="en-US" altLang="ja-JP" sz="1100" dirty="0">
+                <a:solidFill>
+                  <a:srgbClr val="FF0000"/>
+                </a:solidFill>
+                <a:latin typeface="Cascadia Mono" panose="020B0609020000020004" pitchFamily="49" charset="0"/>
+              </a:rPr>
+              <a:t>Element12Element32Element22</a:t>
+            </a:r>
+          </a:p>
+          <a:p>
+            <a:r>
+              <a:rPr lang="en-US" altLang="ja-JP" sz="1100" dirty="0">
+                <a:solidFill>
+                  <a:srgbClr val="FF0000"/>
+                </a:solidFill>
+                <a:latin typeface="Cascadia Mono" panose="020B0609020000020004" pitchFamily="49" charset="0"/>
+              </a:rPr>
+              <a:t>========</a:t>
+            </a:r>
+            <a:r>
+              <a:rPr lang="en-US" altLang="ja-JP" sz="1100" dirty="0" err="1">
+                <a:solidFill>
+                  <a:srgbClr val="FF0000"/>
+                </a:solidFill>
+                <a:latin typeface="Cascadia Mono" panose="020B0609020000020004" pitchFamily="49" charset="0"/>
+              </a:rPr>
+              <a:t>SubThread</a:t>
+            </a:r>
+            <a:r>
+              <a:rPr lang="en-US" altLang="ja-JP" sz="1100" dirty="0">
+                <a:solidFill>
+                  <a:srgbClr val="FF0000"/>
+                </a:solidFill>
+                <a:latin typeface="Cascadia Mono" panose="020B0609020000020004" pitchFamily="49" charset="0"/>
+              </a:rPr>
+              <a:t> 1 after:=======</a:t>
+            </a:r>
+          </a:p>
+          <a:p>
+            <a:r>
+              <a:rPr lang="en-US" altLang="ja-JP" sz="1100" dirty="0">
+                <a:solidFill>
+                  <a:srgbClr val="FF0000"/>
+                </a:solidFill>
+                <a:latin typeface="Cascadia Mono" panose="020B0609020000020004" pitchFamily="49" charset="0"/>
+              </a:rPr>
+              <a:t>Element11Element31Element21</a:t>
+            </a:r>
+          </a:p>
+          <a:p>
+            <a:r>
+              <a:rPr lang="en-US" altLang="ja-JP" sz="1100" dirty="0">
+                <a:solidFill>
+                  <a:srgbClr val="FF0000"/>
+                </a:solidFill>
+                <a:latin typeface="Cascadia Mono" panose="020B0609020000020004" pitchFamily="49" charset="0"/>
+              </a:rPr>
+              <a:t>Element12Element32Element22</a:t>
+            </a:r>
+          </a:p>
+          <a:p>
+            <a:r>
+              <a:rPr lang="en-US" altLang="ja-JP" sz="1100" dirty="0">
+                <a:solidFill>
+                  <a:srgbClr val="FF0000"/>
+                </a:solidFill>
+                <a:latin typeface="Cascadia Mono" panose="020B0609020000020004" pitchFamily="49" charset="0"/>
+              </a:rPr>
+              <a:t>========</a:t>
+            </a:r>
+            <a:r>
+              <a:rPr lang="en-US" altLang="ja-JP" sz="1100" dirty="0" err="1">
+                <a:solidFill>
+                  <a:srgbClr val="FF0000"/>
+                </a:solidFill>
+                <a:latin typeface="Cascadia Mono" panose="020B0609020000020004" pitchFamily="49" charset="0"/>
+              </a:rPr>
+              <a:t>SubThread</a:t>
+            </a:r>
+            <a:r>
+              <a:rPr lang="en-US" altLang="ja-JP" sz="1100" dirty="0">
+                <a:solidFill>
+                  <a:srgbClr val="FF0000"/>
+                </a:solidFill>
+                <a:latin typeface="Cascadia Mono" panose="020B0609020000020004" pitchFamily="49" charset="0"/>
+              </a:rPr>
+              <a:t> 2 after:=======</a:t>
+            </a:r>
+          </a:p>
+          <a:p>
+            <a:r>
+              <a:rPr lang="en-US" altLang="ja-JP" sz="1100" dirty="0">
+                <a:solidFill>
+                  <a:srgbClr val="FF0000"/>
+                </a:solidFill>
+                <a:latin typeface="Cascadia Mono" panose="020B0609020000020004" pitchFamily="49" charset="0"/>
+              </a:rPr>
+              <a:t>Element12Element32Element22</a:t>
+            </a:r>
+          </a:p>
+          <a:p>
+            <a:r>
+              <a:rPr lang="en-US" altLang="ja-JP" sz="1100" dirty="0">
+                <a:solidFill>
+                  <a:srgbClr val="FF0000"/>
+                </a:solidFill>
+                <a:latin typeface="Cascadia Mono" panose="020B0609020000020004" pitchFamily="49" charset="0"/>
+              </a:rPr>
+              <a:t>========</a:t>
+            </a:r>
+            <a:r>
+              <a:rPr lang="en-US" altLang="ja-JP" sz="1100" dirty="0" err="1">
+                <a:solidFill>
+                  <a:srgbClr val="FF0000"/>
+                </a:solidFill>
+                <a:latin typeface="Cascadia Mono" panose="020B0609020000020004" pitchFamily="49" charset="0"/>
+              </a:rPr>
+              <a:t>SubThread</a:t>
+            </a:r>
+            <a:r>
+              <a:rPr lang="en-US" altLang="ja-JP" sz="1100" dirty="0">
+                <a:solidFill>
+                  <a:srgbClr val="FF0000"/>
+                </a:solidFill>
+                <a:latin typeface="Cascadia Mono" panose="020B0609020000020004" pitchFamily="49" charset="0"/>
+              </a:rPr>
+              <a:t> 1 before:=======</a:t>
+            </a:r>
+          </a:p>
+          <a:p>
+            <a:r>
+              <a:rPr lang="en-US" altLang="ja-JP" sz="1100" dirty="0">
+                <a:solidFill>
+                  <a:srgbClr val="FF0000"/>
+                </a:solidFill>
+                <a:latin typeface="Cascadia Mono" panose="020B0609020000020004" pitchFamily="49" charset="0"/>
+              </a:rPr>
+              <a:t>Element12Element32Element22</a:t>
+            </a:r>
+          </a:p>
+          <a:p>
+            <a:r>
+              <a:rPr lang="en-US" altLang="ja-JP" sz="1100" dirty="0">
+                <a:solidFill>
+                  <a:srgbClr val="FF0000"/>
+                </a:solidFill>
+                <a:latin typeface="Cascadia Mono" panose="020B0609020000020004" pitchFamily="49" charset="0"/>
+              </a:rPr>
+              <a:t>========</a:t>
+            </a:r>
+            <a:r>
+              <a:rPr lang="en-US" altLang="ja-JP" sz="1100" dirty="0" err="1">
+                <a:solidFill>
+                  <a:srgbClr val="FF0000"/>
+                </a:solidFill>
+                <a:latin typeface="Cascadia Mono" panose="020B0609020000020004" pitchFamily="49" charset="0"/>
+              </a:rPr>
+              <a:t>SubThread</a:t>
+            </a:r>
+            <a:r>
+              <a:rPr lang="en-US" altLang="ja-JP" sz="1100" dirty="0">
+                <a:solidFill>
+                  <a:srgbClr val="FF0000"/>
+                </a:solidFill>
+                <a:latin typeface="Cascadia Mono" panose="020B0609020000020004" pitchFamily="49" charset="0"/>
+              </a:rPr>
+              <a:t> 2 before:=======</a:t>
+            </a:r>
+          </a:p>
+          <a:p>
+            <a:r>
+              <a:rPr lang="en-US" altLang="ja-JP" sz="1100" dirty="0">
+                <a:solidFill>
+                  <a:srgbClr val="FF0000"/>
+                </a:solidFill>
+                <a:latin typeface="Cascadia Mono" panose="020B0609020000020004" pitchFamily="49" charset="0"/>
+              </a:rPr>
+              <a:t>Element11Element31Element21</a:t>
+            </a:r>
+          </a:p>
+          <a:p>
+            <a:r>
+              <a:rPr lang="en-US" altLang="ja-JP" sz="1100" dirty="0">
+                <a:solidFill>
+                  <a:srgbClr val="FF0000"/>
+                </a:solidFill>
+                <a:latin typeface="Cascadia Mono" panose="020B0609020000020004" pitchFamily="49" charset="0"/>
+              </a:rPr>
+              <a:t>========</a:t>
+            </a:r>
+            <a:r>
+              <a:rPr lang="en-US" altLang="ja-JP" sz="1100" dirty="0" err="1">
+                <a:solidFill>
+                  <a:srgbClr val="FF0000"/>
+                </a:solidFill>
+                <a:latin typeface="Cascadia Mono" panose="020B0609020000020004" pitchFamily="49" charset="0"/>
+              </a:rPr>
+              <a:t>SubThread</a:t>
+            </a:r>
+            <a:r>
+              <a:rPr lang="en-US" altLang="ja-JP" sz="1100" dirty="0">
+                <a:solidFill>
+                  <a:srgbClr val="FF0000"/>
+                </a:solidFill>
+                <a:latin typeface="Cascadia Mono" panose="020B0609020000020004" pitchFamily="49" charset="0"/>
+              </a:rPr>
+              <a:t> 2 after:=======</a:t>
+            </a:r>
+          </a:p>
+          <a:p>
+            <a:endParaRPr lang="ja-JP" altLang="en-US" sz="1100" dirty="0">
+              <a:solidFill>
+                <a:srgbClr val="FF0000"/>
+              </a:solidFill>
+              <a:latin typeface="Cascadia Mono" panose="020B0609020000020004" pitchFamily="49" charset="0"/>
+            </a:endParaRPr>
+          </a:p>
+          <a:p>
+            <a:r>
+              <a:rPr lang="en-US" altLang="ja-JP" sz="1100" dirty="0">
+                <a:solidFill>
+                  <a:srgbClr val="FF0000"/>
+                </a:solidFill>
+                <a:latin typeface="Cascadia Mono" panose="020B0609020000020004" pitchFamily="49" charset="0"/>
+              </a:rPr>
+              <a:t>========</a:t>
+            </a:r>
+            <a:r>
+              <a:rPr lang="en-US" altLang="ja-JP" sz="1100" dirty="0" err="1">
+                <a:solidFill>
+                  <a:srgbClr val="FF0000"/>
+                </a:solidFill>
+                <a:latin typeface="Cascadia Mono" panose="020B0609020000020004" pitchFamily="49" charset="0"/>
+              </a:rPr>
+              <a:t>SubThread</a:t>
+            </a:r>
+            <a:r>
+              <a:rPr lang="en-US" altLang="ja-JP" sz="1100" dirty="0">
+                <a:solidFill>
+                  <a:srgbClr val="FF0000"/>
+                </a:solidFill>
+                <a:latin typeface="Cascadia Mono" panose="020B0609020000020004" pitchFamily="49" charset="0"/>
+              </a:rPr>
+              <a:t> 1 after:=======</a:t>
+            </a:r>
+            <a:endParaRPr lang="ja-JP" altLang="en-US" sz="1100" dirty="0">
+              <a:solidFill>
+                <a:srgbClr val="FF0000"/>
+              </a:solidFill>
+            </a:endParaRPr>
+          </a:p>
+        </p:txBody>
+      </p:sp>
+      <p:sp>
+        <p:nvSpPr>
+          <p:cNvPr id="10" name="TextBox 9">
+            <a:extLst>
+              <a:ext uri="{FF2B5EF4-FFF2-40B4-BE49-F238E27FC236}">
+                <a16:creationId xmlns:a16="http://schemas.microsoft.com/office/drawing/2014/main" id="{BA551580-139D-4641-97FD-6F59E49B0E4B}"/>
+              </a:ext>
+            </a:extLst>
+          </p:cNvPr>
+          <p:cNvSpPr txBox="1"/>
+          <p:nvPr/>
+        </p:nvSpPr>
+        <p:spPr>
+          <a:xfrm>
+            <a:off x="5364490" y="2622775"/>
+            <a:ext cx="6827510" cy="276999"/>
+          </a:xfrm>
+          <a:prstGeom prst="rect">
+            <a:avLst/>
+          </a:prstGeom>
+          <a:noFill/>
+        </p:spPr>
+        <p:txBody>
           <a:bodyPr wrap="none" rtlCol="0">
             <a:spAutoFit/>
           </a:bodyPr>
           <a:lstStyle/>
           <a:p>
             <a:r>
-              <a:rPr lang="en-US" altLang="ja-JP" dirty="0" err="1">
-                <a:hlinkClick r:id="rId2"/>
-              </a:rPr>
-              <a:t>XmlSerializer.Deserialize</a:t>
-            </a:r>
-            <a:r>
-              <a:rPr lang="en-US" altLang="ja-JP" dirty="0">
-                <a:hlinkClick r:id="rId2"/>
+              <a:rPr lang="en-US" altLang="ja-JP" sz="1200" dirty="0" err="1">
+                <a:solidFill>
+                  <a:srgbClr val="00B050"/>
+                </a:solidFill>
+                <a:latin typeface="Cascadia Mono" panose="020B0609020000020004" pitchFamily="49" charset="0"/>
+              </a:rPr>
+              <a:t>Bình</a:t>
+            </a:r>
+            <a:r>
+              <a:rPr lang="en-US" altLang="ja-JP" sz="1200" dirty="0">
+                <a:solidFill>
+                  <a:srgbClr val="00B050"/>
+                </a:solidFill>
+                <a:latin typeface="Cascadia Mono" panose="020B0609020000020004" pitchFamily="49" charset="0"/>
               </a:rPr>
               <a:t> </a:t>
             </a:r>
             <a:r>
-              <a:rPr lang="ja-JP" altLang="en-US" dirty="0">
-                <a:hlinkClick r:id="rId2"/>
-              </a:rPr>
-              <a:t>メソッド </a:t>
-            </a:r>
-            <a:r>
-              <a:rPr lang="en-US" altLang="ja-JP" dirty="0">
-                <a:hlinkClick r:id="rId2"/>
-              </a:rPr>
-              <a:t>(</a:t>
-            </a:r>
-            <a:r>
-              <a:rPr lang="en-US" altLang="ja-JP" dirty="0" err="1">
-                <a:hlinkClick r:id="rId2"/>
-              </a:rPr>
-              <a:t>System.Xml.Serialization</a:t>
-            </a:r>
-            <a:r>
-              <a:rPr lang="en-US" altLang="ja-JP" dirty="0">
-                <a:hlinkClick r:id="rId2"/>
-              </a:rPr>
-              <a:t>) | Microsoft Learn</a:t>
-            </a:r>
-            <a:endParaRPr lang="en-US" altLang="ja-JP" dirty="0"/>
-          </a:p>
+              <a:rPr lang="en-US" altLang="ja-JP" sz="1200" dirty="0" err="1">
+                <a:solidFill>
+                  <a:srgbClr val="00B050"/>
+                </a:solidFill>
+                <a:latin typeface="Cascadia Mono" panose="020B0609020000020004" pitchFamily="49" charset="0"/>
+              </a:rPr>
+              <a:t>thường</a:t>
+            </a:r>
+            <a:r>
+              <a:rPr lang="en-US" altLang="ja-JP" sz="1200" dirty="0">
+                <a:solidFill>
+                  <a:srgbClr val="00B050"/>
+                </a:solidFill>
+                <a:latin typeface="Cascadia Mono" panose="020B0609020000020004" pitchFamily="49" charset="0"/>
+              </a:rPr>
+              <a:t> </a:t>
+            </a:r>
+            <a:r>
+              <a:rPr lang="en-US" altLang="ja-JP" sz="1200" dirty="0" err="1">
+                <a:solidFill>
+                  <a:srgbClr val="00B050"/>
+                </a:solidFill>
+                <a:latin typeface="Cascadia Mono" panose="020B0609020000020004" pitchFamily="49" charset="0"/>
+              </a:rPr>
+              <a:t>khi</a:t>
+            </a:r>
+            <a:r>
+              <a:rPr lang="en-US" altLang="ja-JP" sz="1200" dirty="0">
+                <a:solidFill>
+                  <a:srgbClr val="00B050"/>
+                </a:solidFill>
+                <a:latin typeface="Cascadia Mono" panose="020B0609020000020004" pitchFamily="49" charset="0"/>
+              </a:rPr>
+              <a:t> thread 1 vs 2 </a:t>
+            </a:r>
+            <a:r>
+              <a:rPr lang="en-US" altLang="ja-JP" sz="1200" dirty="0" err="1">
+                <a:solidFill>
+                  <a:srgbClr val="00B050"/>
+                </a:solidFill>
+                <a:latin typeface="Cascadia Mono" panose="020B0609020000020004" pitchFamily="49" charset="0"/>
+              </a:rPr>
+              <a:t>truy</a:t>
+            </a:r>
+            <a:r>
+              <a:rPr lang="en-US" altLang="ja-JP" sz="1200" dirty="0">
+                <a:solidFill>
+                  <a:srgbClr val="00B050"/>
+                </a:solidFill>
+                <a:latin typeface="Cascadia Mono" panose="020B0609020000020004" pitchFamily="49" charset="0"/>
+              </a:rPr>
+              <a:t> </a:t>
+            </a:r>
+            <a:r>
+              <a:rPr lang="en-US" altLang="ja-JP" sz="1200" dirty="0" err="1">
+                <a:solidFill>
+                  <a:srgbClr val="00B050"/>
+                </a:solidFill>
+                <a:latin typeface="Cascadia Mono" panose="020B0609020000020004" pitchFamily="49" charset="0"/>
+              </a:rPr>
+              <a:t>cập</a:t>
+            </a:r>
+            <a:r>
+              <a:rPr lang="en-US" altLang="ja-JP" sz="1200" dirty="0">
+                <a:solidFill>
+                  <a:srgbClr val="00B050"/>
+                </a:solidFill>
+                <a:latin typeface="Cascadia Mono" panose="020B0609020000020004" pitchFamily="49" charset="0"/>
+              </a:rPr>
+              <a:t> </a:t>
+            </a:r>
+            <a:r>
+              <a:rPr lang="en-US" altLang="ja-JP" sz="1200" dirty="0" err="1">
+                <a:solidFill>
+                  <a:srgbClr val="00B050"/>
+                </a:solidFill>
+                <a:latin typeface="Cascadia Mono" panose="020B0609020000020004" pitchFamily="49" charset="0"/>
+              </a:rPr>
+              <a:t>vào</a:t>
+            </a:r>
+            <a:r>
+              <a:rPr lang="en-US" altLang="ja-JP" sz="1200" dirty="0">
+                <a:solidFill>
+                  <a:srgbClr val="00B050"/>
+                </a:solidFill>
+                <a:latin typeface="Cascadia Mono" panose="020B0609020000020004" pitchFamily="49" charset="0"/>
+              </a:rPr>
+              <a:t> xml ko </a:t>
+            </a:r>
+            <a:r>
+              <a:rPr lang="en-US" altLang="ja-JP" sz="1200" dirty="0" err="1">
+                <a:solidFill>
+                  <a:srgbClr val="00B050"/>
+                </a:solidFill>
+                <a:latin typeface="Cascadia Mono" panose="020B0609020000020004" pitchFamily="49" charset="0"/>
+              </a:rPr>
+              <a:t>đồng</a:t>
+            </a:r>
+            <a:r>
+              <a:rPr lang="en-US" altLang="ja-JP" sz="1200" dirty="0">
+                <a:solidFill>
+                  <a:srgbClr val="00B050"/>
+                </a:solidFill>
+                <a:latin typeface="Cascadia Mono" panose="020B0609020000020004" pitchFamily="49" charset="0"/>
+              </a:rPr>
+              <a:t> </a:t>
+            </a:r>
+            <a:r>
+              <a:rPr lang="en-US" altLang="ja-JP" sz="1200" dirty="0" err="1">
+                <a:solidFill>
+                  <a:srgbClr val="00B050"/>
+                </a:solidFill>
+                <a:latin typeface="Cascadia Mono" panose="020B0609020000020004" pitchFamily="49" charset="0"/>
+              </a:rPr>
+              <a:t>thời</a:t>
+            </a:r>
+            <a:r>
+              <a:rPr lang="en-US" altLang="ja-JP" sz="1200" dirty="0">
+                <a:solidFill>
+                  <a:srgbClr val="00B050"/>
+                </a:solidFill>
+                <a:latin typeface="Cascadia Mono" panose="020B0609020000020004" pitchFamily="49" charset="0"/>
+              </a:rPr>
+              <a:t> </a:t>
+            </a:r>
+            <a:r>
+              <a:rPr lang="en-US" altLang="ja-JP" sz="1200" dirty="0" err="1">
+                <a:solidFill>
+                  <a:srgbClr val="00B050"/>
+                </a:solidFill>
+                <a:latin typeface="Cascadia Mono" panose="020B0609020000020004" pitchFamily="49" charset="0"/>
+              </a:rPr>
+              <a:t>thì</a:t>
+            </a:r>
+            <a:r>
+              <a:rPr lang="en-US" altLang="ja-JP" sz="1200" dirty="0">
+                <a:solidFill>
+                  <a:srgbClr val="00B050"/>
+                </a:solidFill>
+                <a:latin typeface="Cascadia Mono" panose="020B0609020000020004" pitchFamily="49" charset="0"/>
+              </a:rPr>
+              <a:t> </a:t>
+            </a:r>
+            <a:r>
+              <a:rPr lang="en-US" altLang="ja-JP" sz="1200" dirty="0" err="1">
+                <a:solidFill>
+                  <a:srgbClr val="00B050"/>
+                </a:solidFill>
+                <a:latin typeface="Cascadia Mono" panose="020B0609020000020004" pitchFamily="49" charset="0"/>
+              </a:rPr>
+              <a:t>sẽ</a:t>
+            </a:r>
+            <a:r>
+              <a:rPr lang="en-US" altLang="ja-JP" sz="1200" dirty="0">
+                <a:solidFill>
+                  <a:srgbClr val="00B050"/>
+                </a:solidFill>
+                <a:latin typeface="Cascadia Mono" panose="020B0609020000020004" pitchFamily="49" charset="0"/>
+              </a:rPr>
+              <a:t> </a:t>
+            </a:r>
+            <a:r>
+              <a:rPr lang="en-US" altLang="ja-JP" sz="1200" dirty="0" err="1">
+                <a:solidFill>
+                  <a:srgbClr val="00B050"/>
+                </a:solidFill>
+                <a:latin typeface="Cascadia Mono" panose="020B0609020000020004" pitchFamily="49" charset="0"/>
+              </a:rPr>
+              <a:t>như</a:t>
+            </a:r>
+            <a:r>
+              <a:rPr lang="en-US" altLang="ja-JP" sz="1200" dirty="0">
+                <a:solidFill>
+                  <a:srgbClr val="00B050"/>
+                </a:solidFill>
+                <a:latin typeface="Cascadia Mono" panose="020B0609020000020004" pitchFamily="49" charset="0"/>
+              </a:rPr>
+              <a:t> </a:t>
+            </a:r>
+            <a:r>
+              <a:rPr lang="en-US" altLang="ja-JP" sz="1200" dirty="0" err="1">
+                <a:solidFill>
+                  <a:srgbClr val="00B050"/>
+                </a:solidFill>
+                <a:latin typeface="Cascadia Mono" panose="020B0609020000020004" pitchFamily="49" charset="0"/>
+              </a:rPr>
+              <a:t>vậy</a:t>
+            </a:r>
+            <a:endParaRPr kumimoji="1" lang="ja-JP" altLang="en-US" sz="1200" dirty="0"/>
+          </a:p>
+        </p:txBody>
+      </p:sp>
+      <p:sp>
+        <p:nvSpPr>
+          <p:cNvPr id="11" name="TextBox 10">
+            <a:extLst>
+              <a:ext uri="{FF2B5EF4-FFF2-40B4-BE49-F238E27FC236}">
+                <a16:creationId xmlns:a16="http://schemas.microsoft.com/office/drawing/2014/main" id="{295A82D7-2AEB-4C75-8B46-54C97EADBB4E}"/>
+              </a:ext>
+            </a:extLst>
+          </p:cNvPr>
+          <p:cNvSpPr txBox="1"/>
+          <p:nvPr/>
+        </p:nvSpPr>
+        <p:spPr>
+          <a:xfrm>
+            <a:off x="5286155" y="4462732"/>
+            <a:ext cx="6618138" cy="1015663"/>
+          </a:xfrm>
+          <a:prstGeom prst="rect">
+            <a:avLst/>
+          </a:prstGeom>
+          <a:noFill/>
+        </p:spPr>
+        <p:txBody>
+          <a:bodyPr wrap="square" rtlCol="0">
+            <a:spAutoFit/>
+          </a:bodyPr>
+          <a:lstStyle/>
+          <a:p>
+            <a:r>
+              <a:rPr kumimoji="1" lang="en-US" altLang="ja-JP" sz="1200" dirty="0" err="1">
+                <a:solidFill>
+                  <a:srgbClr val="FF0000"/>
+                </a:solidFill>
+                <a:latin typeface="Cascadia Mono" panose="020B0609020000020004" pitchFamily="49" charset="0"/>
+              </a:rPr>
+              <a:t>Trong</a:t>
+            </a:r>
+            <a:r>
+              <a:rPr kumimoji="1" lang="en-US" altLang="ja-JP" sz="1200" dirty="0">
+                <a:solidFill>
+                  <a:srgbClr val="FF0000"/>
+                </a:solidFill>
+                <a:latin typeface="Cascadia Mono" panose="020B0609020000020004" pitchFamily="49" charset="0"/>
+              </a:rPr>
+              <a:t> </a:t>
+            </a:r>
+            <a:r>
+              <a:rPr lang="en-US" altLang="ja-JP" sz="1200" dirty="0">
+                <a:solidFill>
+                  <a:srgbClr val="FF0000"/>
+                </a:solidFill>
+                <a:latin typeface="Cascadia Mono" panose="020B0609020000020004" pitchFamily="49" charset="0"/>
+              </a:rPr>
+              <a:t>TH 2 thread </a:t>
+            </a:r>
+            <a:r>
+              <a:rPr lang="en-US" altLang="ja-JP" sz="1200" dirty="0" err="1">
+                <a:solidFill>
+                  <a:srgbClr val="FF0000"/>
+                </a:solidFill>
+                <a:latin typeface="Cascadia Mono" panose="020B0609020000020004" pitchFamily="49" charset="0"/>
+              </a:rPr>
+              <a:t>cùng</a:t>
+            </a:r>
+            <a:r>
+              <a:rPr lang="en-US" altLang="ja-JP" sz="1200" dirty="0">
+                <a:solidFill>
+                  <a:srgbClr val="FF0000"/>
+                </a:solidFill>
+                <a:latin typeface="Cascadia Mono" panose="020B0609020000020004" pitchFamily="49" charset="0"/>
+              </a:rPr>
+              <a:t> </a:t>
+            </a:r>
+            <a:r>
+              <a:rPr lang="en-US" altLang="ja-JP" sz="1200" dirty="0" err="1">
+                <a:solidFill>
+                  <a:srgbClr val="FF0000"/>
+                </a:solidFill>
+                <a:latin typeface="Cascadia Mono" panose="020B0609020000020004" pitchFamily="49" charset="0"/>
+              </a:rPr>
+              <a:t>truy</a:t>
+            </a:r>
+            <a:r>
+              <a:rPr lang="en-US" altLang="ja-JP" sz="1200" dirty="0">
+                <a:solidFill>
+                  <a:srgbClr val="FF0000"/>
+                </a:solidFill>
+                <a:latin typeface="Cascadia Mono" panose="020B0609020000020004" pitchFamily="49" charset="0"/>
+              </a:rPr>
+              <a:t> </a:t>
+            </a:r>
+            <a:r>
+              <a:rPr lang="en-US" altLang="ja-JP" sz="1200" dirty="0" err="1">
+                <a:solidFill>
+                  <a:srgbClr val="FF0000"/>
+                </a:solidFill>
+                <a:latin typeface="Cascadia Mono" panose="020B0609020000020004" pitchFamily="49" charset="0"/>
+              </a:rPr>
+              <a:t>cập</a:t>
+            </a:r>
+            <a:r>
+              <a:rPr lang="en-US" altLang="ja-JP" sz="1200" dirty="0">
+                <a:solidFill>
+                  <a:srgbClr val="FF0000"/>
+                </a:solidFill>
+                <a:latin typeface="Cascadia Mono" panose="020B0609020000020004" pitchFamily="49" charset="0"/>
+              </a:rPr>
+              <a:t> </a:t>
+            </a:r>
+            <a:r>
+              <a:rPr lang="en-US" altLang="ja-JP" sz="1200" dirty="0" err="1">
+                <a:solidFill>
+                  <a:srgbClr val="FF0000"/>
+                </a:solidFill>
+                <a:latin typeface="Cascadia Mono" panose="020B0609020000020004" pitchFamily="49" charset="0"/>
+              </a:rPr>
+              <a:t>vào</a:t>
+            </a:r>
+            <a:r>
+              <a:rPr lang="en-US" altLang="ja-JP" sz="1200" dirty="0">
+                <a:solidFill>
+                  <a:srgbClr val="FF0000"/>
+                </a:solidFill>
+                <a:latin typeface="Cascadia Mono" panose="020B0609020000020004" pitchFamily="49" charset="0"/>
+              </a:rPr>
+              <a:t> </a:t>
+            </a:r>
+            <a:r>
+              <a:rPr lang="en-US" altLang="ja-JP" sz="1200" dirty="0" err="1">
+                <a:solidFill>
+                  <a:srgbClr val="FF0000"/>
+                </a:solidFill>
+                <a:latin typeface="Cascadia Mono" panose="020B0609020000020004" pitchFamily="49" charset="0"/>
+              </a:rPr>
+              <a:t>đói</a:t>
+            </a:r>
+            <a:r>
+              <a:rPr lang="en-US" altLang="ja-JP" sz="1200" dirty="0">
+                <a:solidFill>
+                  <a:srgbClr val="FF0000"/>
+                </a:solidFill>
+                <a:latin typeface="Cascadia Mono" panose="020B0609020000020004" pitchFamily="49" charset="0"/>
+              </a:rPr>
+              <a:t> </a:t>
+            </a:r>
+            <a:r>
+              <a:rPr lang="en-US" altLang="ja-JP" sz="1200" dirty="0" err="1">
+                <a:solidFill>
+                  <a:srgbClr val="FF0000"/>
+                </a:solidFill>
+                <a:latin typeface="Cascadia Mono" panose="020B0609020000020004" pitchFamily="49" charset="0"/>
+              </a:rPr>
+              <a:t>tượng</a:t>
+            </a:r>
+            <a:r>
+              <a:rPr lang="en-US" altLang="ja-JP" sz="1200" dirty="0">
+                <a:solidFill>
+                  <a:srgbClr val="FF0000"/>
+                </a:solidFill>
+                <a:latin typeface="Cascadia Mono" panose="020B0609020000020004" pitchFamily="49" charset="0"/>
+              </a:rPr>
+              <a:t> xml setting </a:t>
+            </a:r>
+            <a:r>
+              <a:rPr lang="en-US" altLang="ja-JP" sz="1200" dirty="0" err="1">
+                <a:solidFill>
+                  <a:srgbClr val="FF0000"/>
+                </a:solidFill>
+                <a:latin typeface="Cascadia Mono" panose="020B0609020000020004" pitchFamily="49" charset="0"/>
+              </a:rPr>
+              <a:t>thì</a:t>
+            </a:r>
+            <a:r>
+              <a:rPr lang="en-US" altLang="ja-JP" sz="1200" dirty="0">
+                <a:solidFill>
+                  <a:srgbClr val="FF0000"/>
+                </a:solidFill>
+                <a:latin typeface="Cascadia Mono" panose="020B0609020000020004" pitchFamily="49" charset="0"/>
+              </a:rPr>
+              <a:t> </a:t>
+            </a:r>
+            <a:r>
+              <a:rPr lang="en-US" altLang="ja-JP" sz="1200" dirty="0" err="1">
+                <a:solidFill>
+                  <a:srgbClr val="FF0000"/>
+                </a:solidFill>
+                <a:latin typeface="Cascadia Mono" panose="020B0609020000020004" pitchFamily="49" charset="0"/>
+              </a:rPr>
+              <a:t>sẽ</a:t>
+            </a:r>
+            <a:r>
+              <a:rPr lang="en-US" altLang="ja-JP" sz="1200" dirty="0">
+                <a:solidFill>
+                  <a:srgbClr val="FF0000"/>
+                </a:solidFill>
+                <a:latin typeface="Cascadia Mono" panose="020B0609020000020004" pitchFamily="49" charset="0"/>
+              </a:rPr>
+              <a:t> </a:t>
+            </a:r>
+            <a:r>
+              <a:rPr lang="en-US" altLang="ja-JP" sz="1200" dirty="0" err="1">
+                <a:solidFill>
+                  <a:srgbClr val="FF0000"/>
+                </a:solidFill>
+                <a:latin typeface="Cascadia Mono" panose="020B0609020000020004" pitchFamily="49" charset="0"/>
+              </a:rPr>
+              <a:t>bị</a:t>
+            </a:r>
+            <a:r>
+              <a:rPr lang="en-US" altLang="ja-JP" sz="1200" dirty="0">
+                <a:solidFill>
+                  <a:srgbClr val="FF0000"/>
+                </a:solidFill>
+                <a:latin typeface="Cascadia Mono" panose="020B0609020000020004" pitchFamily="49" charset="0"/>
+              </a:rPr>
+              <a:t> </a:t>
+            </a:r>
+            <a:r>
+              <a:rPr lang="en-US" altLang="ja-JP" sz="1200" dirty="0" err="1">
+                <a:solidFill>
+                  <a:srgbClr val="FF0000"/>
+                </a:solidFill>
+                <a:latin typeface="Cascadia Mono" panose="020B0609020000020004" pitchFamily="49" charset="0"/>
+              </a:rPr>
+              <a:t>loạn</a:t>
+            </a:r>
+            <a:r>
+              <a:rPr lang="en-US" altLang="ja-JP" sz="1200" dirty="0">
+                <a:solidFill>
+                  <a:srgbClr val="FF0000"/>
+                </a:solidFill>
+                <a:latin typeface="Cascadia Mono" panose="020B0609020000020004" pitchFamily="49" charset="0"/>
+              </a:rPr>
+              <a:t> </a:t>
+            </a:r>
+            <a:r>
+              <a:rPr lang="en-US" altLang="ja-JP" sz="1200" dirty="0" err="1">
+                <a:solidFill>
+                  <a:srgbClr val="FF0000"/>
+                </a:solidFill>
+                <a:latin typeface="Cascadia Mono" panose="020B0609020000020004" pitchFamily="49" charset="0"/>
+              </a:rPr>
+              <a:t>như</a:t>
+            </a:r>
+            <a:r>
+              <a:rPr lang="en-US" altLang="ja-JP" sz="1200" dirty="0">
+                <a:solidFill>
+                  <a:srgbClr val="FF0000"/>
+                </a:solidFill>
+                <a:latin typeface="Cascadia Mono" panose="020B0609020000020004" pitchFamily="49" charset="0"/>
+              </a:rPr>
+              <a:t> </a:t>
+            </a:r>
+            <a:r>
+              <a:rPr lang="en-US" altLang="ja-JP" sz="1200" dirty="0" err="1">
+                <a:solidFill>
+                  <a:srgbClr val="FF0000"/>
+                </a:solidFill>
+                <a:latin typeface="Cascadia Mono" panose="020B0609020000020004" pitchFamily="49" charset="0"/>
+              </a:rPr>
+              <a:t>này</a:t>
+            </a:r>
+            <a:endParaRPr lang="en-US" altLang="ja-JP" sz="1200" dirty="0">
+              <a:solidFill>
+                <a:srgbClr val="FF0000"/>
+              </a:solidFill>
+              <a:latin typeface="Cascadia Mono" panose="020B0609020000020004" pitchFamily="49" charset="0"/>
+            </a:endParaRPr>
+          </a:p>
+          <a:p>
+            <a:endParaRPr kumimoji="1" lang="en-US" altLang="ja-JP" sz="1200" dirty="0">
+              <a:solidFill>
+                <a:srgbClr val="FF0000"/>
+              </a:solidFill>
+              <a:latin typeface="Cascadia Mono" panose="020B0609020000020004" pitchFamily="49" charset="0"/>
+            </a:endParaRPr>
+          </a:p>
+          <a:p>
+            <a:r>
+              <a:rPr lang="en-US" altLang="ja-JP" sz="1200" dirty="0" err="1">
+                <a:solidFill>
+                  <a:srgbClr val="FF0000"/>
+                </a:solidFill>
+                <a:latin typeface="Cascadia Mono" panose="020B0609020000020004" pitchFamily="49" charset="0"/>
+              </a:rPr>
+              <a:t>Để</a:t>
+            </a:r>
+            <a:r>
+              <a:rPr lang="en-US" altLang="ja-JP" sz="1200" dirty="0">
+                <a:solidFill>
+                  <a:srgbClr val="FF0000"/>
+                </a:solidFill>
+                <a:latin typeface="Cascadia Mono" panose="020B0609020000020004" pitchFamily="49" charset="0"/>
+              </a:rPr>
+              <a:t> </a:t>
+            </a:r>
+            <a:r>
+              <a:rPr lang="en-US" altLang="ja-JP" sz="1200" dirty="0" err="1">
+                <a:solidFill>
+                  <a:srgbClr val="FF0000"/>
+                </a:solidFill>
+                <a:latin typeface="Cascadia Mono" panose="020B0609020000020004" pitchFamily="49" charset="0"/>
+              </a:rPr>
+              <a:t>tránh</a:t>
+            </a:r>
+            <a:r>
+              <a:rPr lang="en-US" altLang="ja-JP" sz="1200" dirty="0">
+                <a:solidFill>
+                  <a:srgbClr val="FF0000"/>
+                </a:solidFill>
+                <a:latin typeface="Cascadia Mono" panose="020B0609020000020004" pitchFamily="49" charset="0"/>
+              </a:rPr>
+              <a:t> TH </a:t>
+            </a:r>
+            <a:r>
+              <a:rPr lang="en-US" altLang="ja-JP" sz="1200" dirty="0" err="1">
+                <a:solidFill>
+                  <a:srgbClr val="FF0000"/>
+                </a:solidFill>
+                <a:latin typeface="Cascadia Mono" panose="020B0609020000020004" pitchFamily="49" charset="0"/>
+              </a:rPr>
+              <a:t>này</a:t>
+            </a:r>
+            <a:r>
+              <a:rPr lang="en-US" altLang="ja-JP" sz="1200" dirty="0">
+                <a:solidFill>
+                  <a:srgbClr val="FF0000"/>
+                </a:solidFill>
+                <a:latin typeface="Cascadia Mono" panose="020B0609020000020004" pitchFamily="49" charset="0"/>
+              </a:rPr>
+              <a:t> </a:t>
+            </a:r>
+            <a:r>
+              <a:rPr lang="en-US" altLang="ja-JP" sz="1200" dirty="0" err="1">
+                <a:solidFill>
+                  <a:srgbClr val="FF0000"/>
+                </a:solidFill>
+                <a:latin typeface="Cascadia Mono" panose="020B0609020000020004" pitchFamily="49" charset="0"/>
+              </a:rPr>
+              <a:t>thì</a:t>
+            </a:r>
+            <a:r>
+              <a:rPr lang="en-US" altLang="ja-JP" sz="1200" dirty="0">
+                <a:solidFill>
+                  <a:srgbClr val="FF0000"/>
+                </a:solidFill>
+                <a:latin typeface="Cascadia Mono" panose="020B0609020000020004" pitchFamily="49" charset="0"/>
+              </a:rPr>
+              <a:t> </a:t>
+            </a:r>
+            <a:r>
+              <a:rPr lang="en-US" altLang="ja-JP" sz="1200" dirty="0" err="1">
+                <a:solidFill>
+                  <a:srgbClr val="FF0000"/>
+                </a:solidFill>
+                <a:latin typeface="Cascadia Mono" panose="020B0609020000020004" pitchFamily="49" charset="0"/>
+              </a:rPr>
+              <a:t>cần</a:t>
+            </a:r>
+            <a:r>
+              <a:rPr lang="en-US" altLang="ja-JP" sz="1200" dirty="0">
+                <a:solidFill>
+                  <a:srgbClr val="FF0000"/>
+                </a:solidFill>
+                <a:latin typeface="Cascadia Mono" panose="020B0609020000020004" pitchFamily="49" charset="0"/>
+              </a:rPr>
+              <a:t> </a:t>
+            </a:r>
+            <a:r>
+              <a:rPr lang="en-US" altLang="ja-JP" sz="1200" dirty="0" err="1">
+                <a:solidFill>
+                  <a:srgbClr val="FF0000"/>
+                </a:solidFill>
+                <a:latin typeface="Cascadia Mono" panose="020B0609020000020004" pitchFamily="49" charset="0"/>
+              </a:rPr>
+              <a:t>cơ</a:t>
+            </a:r>
+            <a:r>
+              <a:rPr lang="en-US" altLang="ja-JP" sz="1200" dirty="0">
+                <a:solidFill>
+                  <a:srgbClr val="FF0000"/>
+                </a:solidFill>
+                <a:latin typeface="Cascadia Mono" panose="020B0609020000020004" pitchFamily="49" charset="0"/>
+              </a:rPr>
+              <a:t> </a:t>
+            </a:r>
+            <a:r>
+              <a:rPr lang="en-US" altLang="ja-JP" sz="1200" dirty="0" err="1">
+                <a:solidFill>
+                  <a:srgbClr val="FF0000"/>
+                </a:solidFill>
+                <a:latin typeface="Cascadia Mono" panose="020B0609020000020004" pitchFamily="49" charset="0"/>
+              </a:rPr>
+              <a:t>chế</a:t>
+            </a:r>
+            <a:r>
+              <a:rPr lang="en-US" altLang="ja-JP" sz="1200" dirty="0">
+                <a:solidFill>
+                  <a:srgbClr val="FF0000"/>
+                </a:solidFill>
+                <a:latin typeface="Cascadia Mono" panose="020B0609020000020004" pitchFamily="49" charset="0"/>
+              </a:rPr>
+              <a:t> Semaphore , </a:t>
+            </a:r>
+            <a:r>
+              <a:rPr lang="en-US" altLang="ja-JP" sz="1200" dirty="0" err="1">
+                <a:solidFill>
+                  <a:srgbClr val="FF0000"/>
+                </a:solidFill>
+                <a:latin typeface="Cascadia Mono" panose="020B0609020000020004" pitchFamily="49" charset="0"/>
+              </a:rPr>
+              <a:t>chỉ</a:t>
+            </a:r>
+            <a:r>
+              <a:rPr lang="en-US" altLang="ja-JP" sz="1200" dirty="0">
+                <a:solidFill>
+                  <a:srgbClr val="FF0000"/>
+                </a:solidFill>
+                <a:latin typeface="Cascadia Mono" panose="020B0609020000020004" pitchFamily="49" charset="0"/>
+              </a:rPr>
+              <a:t> </a:t>
+            </a:r>
+            <a:r>
+              <a:rPr lang="en-US" altLang="ja-JP" sz="1200" dirty="0" err="1">
+                <a:solidFill>
+                  <a:srgbClr val="FF0000"/>
+                </a:solidFill>
+                <a:latin typeface="Cascadia Mono" panose="020B0609020000020004" pitchFamily="49" charset="0"/>
+              </a:rPr>
+              <a:t>cho</a:t>
+            </a:r>
+            <a:r>
+              <a:rPr lang="en-US" altLang="ja-JP" sz="1200" dirty="0">
+                <a:solidFill>
+                  <a:srgbClr val="FF0000"/>
+                </a:solidFill>
+                <a:latin typeface="Cascadia Mono" panose="020B0609020000020004" pitchFamily="49" charset="0"/>
+              </a:rPr>
+              <a:t> </a:t>
+            </a:r>
+            <a:r>
+              <a:rPr lang="en-US" altLang="ja-JP" sz="1200" dirty="0" err="1">
+                <a:solidFill>
+                  <a:srgbClr val="FF0000"/>
+                </a:solidFill>
+                <a:latin typeface="Cascadia Mono" panose="020B0609020000020004" pitchFamily="49" charset="0"/>
+              </a:rPr>
+              <a:t>phép</a:t>
+            </a:r>
+            <a:r>
+              <a:rPr lang="en-US" altLang="ja-JP" sz="1200" dirty="0">
+                <a:solidFill>
+                  <a:srgbClr val="FF0000"/>
+                </a:solidFill>
+                <a:latin typeface="Cascadia Mono" panose="020B0609020000020004" pitchFamily="49" charset="0"/>
+              </a:rPr>
+              <a:t> 1 thread </a:t>
+            </a:r>
+            <a:r>
+              <a:rPr lang="en-US" altLang="ja-JP" sz="1200" dirty="0" err="1">
+                <a:solidFill>
+                  <a:srgbClr val="FF0000"/>
+                </a:solidFill>
+                <a:latin typeface="Cascadia Mono" panose="020B0609020000020004" pitchFamily="49" charset="0"/>
+              </a:rPr>
+              <a:t>truy</a:t>
+            </a:r>
+            <a:r>
+              <a:rPr lang="en-US" altLang="ja-JP" sz="1200" dirty="0">
+                <a:solidFill>
+                  <a:srgbClr val="FF0000"/>
+                </a:solidFill>
+                <a:latin typeface="Cascadia Mono" panose="020B0609020000020004" pitchFamily="49" charset="0"/>
+              </a:rPr>
+              <a:t> </a:t>
+            </a:r>
+            <a:r>
+              <a:rPr lang="en-US" altLang="ja-JP" sz="1200" dirty="0" err="1">
+                <a:solidFill>
+                  <a:srgbClr val="FF0000"/>
+                </a:solidFill>
+                <a:latin typeface="Cascadia Mono" panose="020B0609020000020004" pitchFamily="49" charset="0"/>
+              </a:rPr>
+              <a:t>cập</a:t>
+            </a:r>
+            <a:r>
+              <a:rPr lang="en-US" altLang="ja-JP" sz="1200" dirty="0">
+                <a:solidFill>
+                  <a:srgbClr val="FF0000"/>
+                </a:solidFill>
+                <a:latin typeface="Cascadia Mono" panose="020B0609020000020004" pitchFamily="49" charset="0"/>
+              </a:rPr>
+              <a:t> </a:t>
+            </a:r>
+            <a:r>
+              <a:rPr lang="en-US" altLang="ja-JP" sz="1200" dirty="0" err="1">
+                <a:solidFill>
+                  <a:srgbClr val="FF0000"/>
+                </a:solidFill>
+                <a:latin typeface="Cascadia Mono" panose="020B0609020000020004" pitchFamily="49" charset="0"/>
+              </a:rPr>
+              <a:t>tại</a:t>
+            </a:r>
+            <a:r>
+              <a:rPr lang="en-US" altLang="ja-JP" sz="1200" dirty="0">
+                <a:solidFill>
+                  <a:srgbClr val="FF0000"/>
+                </a:solidFill>
+                <a:latin typeface="Cascadia Mono" panose="020B0609020000020004" pitchFamily="49" charset="0"/>
+              </a:rPr>
+              <a:t> 1 </a:t>
+            </a:r>
+            <a:r>
+              <a:rPr lang="en-US" altLang="ja-JP" sz="1200" dirty="0" err="1">
+                <a:solidFill>
+                  <a:srgbClr val="FF0000"/>
+                </a:solidFill>
+                <a:latin typeface="Cascadia Mono" panose="020B0609020000020004" pitchFamily="49" charset="0"/>
+              </a:rPr>
+              <a:t>thời</a:t>
+            </a:r>
+            <a:r>
+              <a:rPr lang="en-US" altLang="ja-JP" sz="1200" dirty="0">
+                <a:solidFill>
+                  <a:srgbClr val="FF0000"/>
+                </a:solidFill>
+                <a:latin typeface="Cascadia Mono" panose="020B0609020000020004" pitchFamily="49" charset="0"/>
+              </a:rPr>
+              <a:t> </a:t>
+            </a:r>
+            <a:r>
+              <a:rPr lang="en-US" altLang="ja-JP" sz="1200" dirty="0" err="1">
+                <a:solidFill>
+                  <a:srgbClr val="FF0000"/>
+                </a:solidFill>
+                <a:latin typeface="Cascadia Mono" panose="020B0609020000020004" pitchFamily="49" charset="0"/>
+              </a:rPr>
+              <a:t>điểm</a:t>
+            </a:r>
+            <a:endParaRPr kumimoji="1" lang="ja-JP" altLang="en-US" sz="1200" dirty="0">
+              <a:solidFill>
+                <a:srgbClr val="FF0000"/>
+              </a:solidFill>
+            </a:endParaRPr>
+          </a:p>
+        </p:txBody>
+      </p:sp>
+      <p:sp>
+        <p:nvSpPr>
+          <p:cNvPr id="12" name="TextBox 11">
+            <a:extLst>
+              <a:ext uri="{FF2B5EF4-FFF2-40B4-BE49-F238E27FC236}">
+                <a16:creationId xmlns:a16="http://schemas.microsoft.com/office/drawing/2014/main" id="{F42D8CD9-8FF4-4D4B-B54E-7A6712A93CC2}"/>
+              </a:ext>
+            </a:extLst>
+          </p:cNvPr>
+          <p:cNvSpPr txBox="1"/>
+          <p:nvPr/>
+        </p:nvSpPr>
+        <p:spPr>
+          <a:xfrm>
+            <a:off x="273465" y="1452785"/>
+            <a:ext cx="5965095" cy="369332"/>
+          </a:xfrm>
+          <a:prstGeom prst="rect">
+            <a:avLst/>
+          </a:prstGeom>
+          <a:noFill/>
+        </p:spPr>
+        <p:txBody>
+          <a:bodyPr wrap="none" rtlCol="0">
+            <a:spAutoFit/>
+          </a:bodyPr>
+          <a:lstStyle/>
           <a:p>
             <a:r>
               <a:rPr kumimoji="1" lang="en-US" altLang="ja-JP" dirty="0" err="1"/>
-              <a:t>Su</a:t>
+              <a:t>Chạy</a:t>
             </a:r>
             <a:r>
               <a:rPr kumimoji="1" lang="en-US" altLang="ja-JP" dirty="0"/>
-              <a:t> dung using </a:t>
+              <a:t> file </a:t>
             </a:r>
             <a:r>
               <a:rPr kumimoji="1" lang="en-US" altLang="ja-JP" dirty="0" err="1"/>
-              <a:t>để</a:t>
-            </a:r>
-            <a:r>
-              <a:rPr kumimoji="1" lang="en-US" altLang="ja-JP" dirty="0"/>
-              <a:t> </a:t>
-            </a:r>
-            <a:r>
-              <a:rPr kumimoji="1" lang="en-US" altLang="ja-JP" dirty="0" err="1"/>
-              <a:t>giải</a:t>
-            </a:r>
-            <a:r>
-              <a:rPr kumimoji="1" lang="en-US" altLang="ja-JP" dirty="0"/>
-              <a:t> </a:t>
-            </a:r>
-            <a:r>
-              <a:rPr kumimoji="1" lang="en-US" altLang="ja-JP" dirty="0" err="1"/>
-              <a:t>phóng</a:t>
-            </a:r>
-            <a:r>
-              <a:rPr kumimoji="1" lang="en-US" altLang="ja-JP" dirty="0"/>
-              <a:t> </a:t>
-            </a:r>
-            <a:r>
-              <a:rPr kumimoji="1" lang="en-US" altLang="ja-JP" dirty="0" err="1"/>
-              <a:t>tài</a:t>
-            </a:r>
-            <a:r>
-              <a:rPr kumimoji="1" lang="en-US" altLang="ja-JP" dirty="0"/>
-              <a:t> Nguyen </a:t>
-            </a:r>
-            <a:r>
-              <a:rPr kumimoji="1" lang="en-US" altLang="ja-JP" dirty="0" err="1"/>
-              <a:t>đối</a:t>
-            </a:r>
-            <a:r>
-              <a:rPr kumimoji="1" lang="en-US" altLang="ja-JP" dirty="0"/>
-              <a:t> </a:t>
-            </a:r>
-            <a:r>
-              <a:rPr kumimoji="1" lang="en-US" altLang="ja-JP" dirty="0" err="1"/>
-              <a:t>với</a:t>
-            </a:r>
-            <a:r>
-              <a:rPr kumimoji="1" lang="en-US" altLang="ja-JP" dirty="0"/>
-              <a:t> 1 </a:t>
-            </a:r>
-            <a:r>
-              <a:rPr kumimoji="1" lang="en-US" altLang="ja-JP" dirty="0" err="1"/>
-              <a:t>số</a:t>
-            </a:r>
-            <a:r>
-              <a:rPr kumimoji="1" lang="en-US" altLang="ja-JP" dirty="0"/>
-              <a:t> TH :</a:t>
-            </a:r>
-          </a:p>
-          <a:p>
-            <a:r>
-              <a:rPr lang="en-US" altLang="ja-JP" dirty="0" err="1">
-                <a:hlinkClick r:id="rId3"/>
-              </a:rPr>
-              <a:t>Sử</a:t>
-            </a:r>
-            <a:r>
-              <a:rPr lang="en-US" altLang="ja-JP" dirty="0">
-                <a:hlinkClick r:id="rId3"/>
-              </a:rPr>
-              <a:t> </a:t>
-            </a:r>
-            <a:r>
-              <a:rPr lang="en-US" altLang="ja-JP" dirty="0" err="1">
-                <a:hlinkClick r:id="rId3"/>
-              </a:rPr>
-              <a:t>dụng</a:t>
-            </a:r>
-            <a:r>
-              <a:rPr lang="en-US" altLang="ja-JP" dirty="0">
-                <a:hlinkClick r:id="rId3"/>
-              </a:rPr>
-              <a:t> </a:t>
-            </a:r>
-            <a:r>
-              <a:rPr lang="en-US" altLang="ja-JP" dirty="0" err="1">
-                <a:hlinkClick r:id="rId3"/>
-              </a:rPr>
-              <a:t>giao</a:t>
-            </a:r>
-            <a:r>
-              <a:rPr lang="en-US" altLang="ja-JP" dirty="0">
-                <a:hlinkClick r:id="rId3"/>
-              </a:rPr>
-              <a:t> </a:t>
-            </a:r>
-            <a:r>
-              <a:rPr lang="en-US" altLang="ja-JP" dirty="0" err="1">
-                <a:hlinkClick r:id="rId3"/>
-              </a:rPr>
-              <a:t>diện</a:t>
-            </a:r>
-            <a:r>
-              <a:rPr lang="en-US" altLang="ja-JP" dirty="0">
-                <a:hlinkClick r:id="rId3"/>
-              </a:rPr>
-              <a:t> </a:t>
-            </a:r>
-            <a:r>
-              <a:rPr lang="en-US" altLang="ja-JP" dirty="0" err="1">
-                <a:hlinkClick r:id="rId3"/>
-              </a:rPr>
-              <a:t>IDisposable</a:t>
-            </a:r>
-            <a:r>
-              <a:rPr lang="en-US" altLang="ja-JP" dirty="0">
-                <a:hlinkClick r:id="rId3"/>
-              </a:rPr>
-              <a:t> </a:t>
-            </a:r>
-            <a:r>
-              <a:rPr lang="en-US" altLang="ja-JP" dirty="0" err="1">
-                <a:hlinkClick r:id="rId3"/>
-              </a:rPr>
-              <a:t>và</a:t>
-            </a:r>
-            <a:r>
-              <a:rPr lang="en-US" altLang="ja-JP" dirty="0">
-                <a:hlinkClick r:id="rId3"/>
-              </a:rPr>
-              <a:t> </a:t>
-            </a:r>
-            <a:r>
-              <a:rPr lang="en-US" altLang="ja-JP" dirty="0" err="1">
-                <a:hlinkClick r:id="rId3"/>
-              </a:rPr>
-              <a:t>từ</a:t>
-            </a:r>
-            <a:r>
-              <a:rPr lang="en-US" altLang="ja-JP" dirty="0">
-                <a:hlinkClick r:id="rId3"/>
-              </a:rPr>
-              <a:t> </a:t>
-            </a:r>
-            <a:r>
-              <a:rPr lang="en-US" altLang="ja-JP" dirty="0" err="1">
-                <a:hlinkClick r:id="rId3"/>
-              </a:rPr>
-              <a:t>khóa</a:t>
-            </a:r>
-            <a:r>
-              <a:rPr lang="en-US" altLang="ja-JP" dirty="0">
-                <a:hlinkClick r:id="rId3"/>
-              </a:rPr>
-              <a:t> using </a:t>
-            </a:r>
-            <a:r>
-              <a:rPr lang="en-US" altLang="ja-JP" dirty="0" err="1">
-                <a:hlinkClick r:id="rId3"/>
-              </a:rPr>
-              <a:t>trong</a:t>
-            </a:r>
-            <a:r>
-              <a:rPr lang="en-US" altLang="ja-JP" dirty="0">
-                <a:hlinkClick r:id="rId3"/>
-              </a:rPr>
-              <a:t> C # Sharp (xuanthulab.net)</a:t>
-            </a:r>
-            <a:endParaRPr lang="en-US" altLang="ja-JP" dirty="0"/>
-          </a:p>
-          <a:p>
+              <a:t>xmlSettingFile_Singleton_WithoutSemaphore</a:t>
+            </a:r>
             <a:endParaRPr kumimoji="1" lang="ja-JP" altLang="en-US" dirty="0"/>
           </a:p>
         </p:txBody>

</xml_diff>